<commit_message>
Version with git pull message escape directions
</commit_message>
<xml_diff>
--- a/GitHub #2.pptx
+++ b/GitHub #2.pptx
@@ -6046,6 +6046,80 @@
           </a:prstGeom>
         </p:spPr>
       </p:pic>
+      <p:sp>
+        <p:nvSpPr>
+          <p:cNvPr id="5" name="Rectangle 4"/>
+          <p:cNvSpPr/>
+          <p:nvPr/>
+        </p:nvSpPr>
+        <p:spPr>
+          <a:xfrm>
+            <a:off x="8852909" y="1560946"/>
+            <a:ext cx="2918691" cy="1782618"/>
+          </a:xfrm>
+          <a:prstGeom prst="rect">
+            <a:avLst/>
+          </a:prstGeom>
+        </p:spPr>
+        <p:style>
+          <a:lnRef idx="2">
+            <a:schemeClr val="accent1">
+              <a:shade val="50000"/>
+            </a:schemeClr>
+          </a:lnRef>
+          <a:fillRef idx="1">
+            <a:schemeClr val="accent1"/>
+          </a:fillRef>
+          <a:effectRef idx="0">
+            <a:schemeClr val="accent1"/>
+          </a:effectRef>
+          <a:fontRef idx="minor">
+            <a:schemeClr val="lt1"/>
+          </a:fontRef>
+        </p:style>
+        <p:txBody>
+          <a:bodyPr rtlCol="0" anchor="ctr"/>
+          <a:lstStyle/>
+          <a:p>
+            <a:pPr algn="ctr"/>
+            <a:r>
+              <a:rPr lang="en-US" dirty="0" smtClean="0"/>
+              <a:t>If you get a message screen after “</a:t>
+            </a:r>
+            <a:r>
+              <a:rPr lang="en-US" dirty="0" err="1" smtClean="0"/>
+              <a:t>git</a:t>
+            </a:r>
+            <a:r>
+              <a:rPr lang="en-US" dirty="0" smtClean="0"/>
+              <a:t> pull”, escape by:</a:t>
+            </a:r>
+          </a:p>
+          <a:p>
+            <a:pPr algn="ctr"/>
+            <a:r>
+              <a:rPr lang="en-US" dirty="0" smtClean="0"/>
+              <a:t>Hold down esc + shift + ;</a:t>
+            </a:r>
+          </a:p>
+          <a:p>
+            <a:pPr algn="ctr"/>
+            <a:r>
+              <a:rPr lang="en-US" dirty="0" smtClean="0"/>
+              <a:t>Then type </a:t>
+            </a:r>
+            <a:r>
+              <a:rPr lang="en-US" dirty="0" err="1" smtClean="0"/>
+              <a:t>wq</a:t>
+            </a:r>
+            <a:r>
+              <a:rPr lang="en-US" dirty="0" smtClean="0"/>
+              <a:t> + hit</a:t>
+            </a:r>
+            <a:endParaRPr lang="en-US" dirty="0"/>
+          </a:p>
+        </p:txBody>
+      </p:sp>
     </p:spTree>
     <p:extLst>
       <p:ext uri="{BB962C8B-B14F-4D97-AF65-F5344CB8AC3E}">

</xml_diff>